<commit_message>
Zweite Version der Präsentation
</commit_message>
<xml_diff>
--- a/Geschäftsmodell/190628Project_Presentation.pptx
+++ b/Geschäftsmodell/190628Project_Presentation.pptx
@@ -5585,7 +5585,7 @@
         <p:spPr>
           <a:xfrm>
             <a:off x="3957638" y="2000249"/>
-            <a:ext cx="7315200" cy="923330"/>
+            <a:ext cx="7315200" cy="1200329"/>
           </a:xfrm>
           <a:prstGeom prst="rect">
             <a:avLst/>
@@ -5608,7 +5608,15 @@
             </a:r>
             <a:r>
               <a:rPr lang="de-DE" dirty="0" smtClean="0"/>
-              <a:t> </a:t>
+              <a:t> = Schutz vor dem Upload von </a:t>
+            </a:r>
+            <a:r>
+              <a:rPr lang="de-DE" dirty="0" err="1" smtClean="0"/>
+              <a:t>urherberrechtlichgeschützten</a:t>
+            </a:r>
+            <a:r>
+              <a:rPr lang="de-DE" dirty="0" smtClean="0"/>
+              <a:t> Inhalten </a:t>
             </a:r>
           </a:p>
           <a:p>
@@ -6018,14 +6026,35 @@
           <a:p>
             <a:r>
               <a:rPr lang="de-DE" dirty="0" smtClean="0"/>
-              <a:t>Server Kosten</a:t>
-            </a:r>
-            <a:r>
-              <a:rPr lang="de-DE" smtClean="0"/>
-              <a:t>	</a:t>
-            </a:r>
-          </a:p>
-          <a:p>
+              <a:t>Server Kosten	</a:t>
+            </a:r>
+          </a:p>
+          <a:p>
+            <a:r>
+              <a:rPr lang="de-DE" dirty="0" smtClean="0"/>
+              <a:t>Tool Chain Kosten</a:t>
+            </a:r>
+          </a:p>
+          <a:p>
+            <a:r>
+              <a:rPr lang="de-DE" dirty="0" smtClean="0"/>
+              <a:t>Patentkosten </a:t>
+            </a:r>
+          </a:p>
+          <a:p>
+            <a:r>
+              <a:rPr lang="de-DE" dirty="0" smtClean="0"/>
+              <a:t>Vertrieb</a:t>
+            </a:r>
+          </a:p>
+          <a:p>
+            <a:endParaRPr lang="de-DE" dirty="0"/>
+          </a:p>
+          <a:p>
+            <a:r>
+              <a:rPr lang="de-DE" dirty="0" smtClean="0"/>
+              <a:t>Summe </a:t>
+            </a:r>
             <a:endParaRPr lang="es-CO" dirty="0"/>
           </a:p>
         </p:txBody>
@@ -6070,6 +6099,40 @@
             <a:r>
               <a:rPr lang="de-DE" dirty="0" smtClean="0"/>
               <a:t>€ 72.000</a:t>
+            </a:r>
+          </a:p>
+          <a:p>
+            <a:pPr algn="r"/>
+            <a:r>
+              <a:rPr lang="de-DE" dirty="0" smtClean="0"/>
+              <a:t>€3.360</a:t>
+            </a:r>
+          </a:p>
+          <a:p>
+            <a:pPr algn="r"/>
+            <a:r>
+              <a:rPr lang="de-DE" dirty="0" smtClean="0"/>
+              <a:t>€ 8.400</a:t>
+            </a:r>
+          </a:p>
+          <a:p>
+            <a:pPr algn="r"/>
+            <a:r>
+              <a:rPr lang="de-DE" dirty="0" smtClean="0"/>
+              <a:t>€ 100.000</a:t>
+            </a:r>
+          </a:p>
+          <a:p>
+            <a:pPr algn="r"/>
+            <a:endParaRPr lang="de-DE" dirty="0"/>
+          </a:p>
+          <a:p>
+            <a:pPr marL="0" indent="0" algn="r">
+              <a:buNone/>
+            </a:pPr>
+            <a:r>
+              <a:rPr lang="de-DE" dirty="0" smtClean="0"/>
+              <a:t>€ 818.260</a:t>
             </a:r>
             <a:endParaRPr lang="es-CO" dirty="0"/>
           </a:p>
@@ -6098,6 +6161,41 @@
           </a:p>
         </p:txBody>
       </p:sp>
+      <p:cxnSp>
+        <p:nvCxnSpPr>
+          <p:cNvPr id="10" name="Gerader Verbinder 9"/>
+          <p:cNvCxnSpPr/>
+          <p:nvPr/>
+        </p:nvCxnSpPr>
+        <p:spPr>
+          <a:xfrm>
+            <a:off x="910114" y="5243513"/>
+            <a:ext cx="10615612" cy="14287"/>
+          </a:xfrm>
+          <a:prstGeom prst="line">
+            <a:avLst/>
+          </a:prstGeom>
+          <a:ln>
+            <a:solidFill>
+              <a:schemeClr val="tx1"/>
+            </a:solidFill>
+          </a:ln>
+        </p:spPr>
+        <p:style>
+          <a:lnRef idx="1">
+            <a:schemeClr val="accent1"/>
+          </a:lnRef>
+          <a:fillRef idx="0">
+            <a:schemeClr val="accent1"/>
+          </a:fillRef>
+          <a:effectRef idx="0">
+            <a:schemeClr val="accent1"/>
+          </a:effectRef>
+          <a:fontRef idx="minor">
+            <a:schemeClr val="tx1"/>
+          </a:fontRef>
+        </p:style>
+      </p:cxnSp>
     </p:spTree>
     <p:extLst>
       <p:ext uri="{BB962C8B-B14F-4D97-AF65-F5344CB8AC3E}">
@@ -6383,6 +6481,141 @@
               <a:t>7</a:t>
             </a:fld>
             <a:endParaRPr lang="es-CO"/>
+          </a:p>
+        </p:txBody>
+      </p:sp>
+      <p:sp>
+        <p:nvSpPr>
+          <p:cNvPr id="9" name="Rechteck 8"/>
+          <p:cNvSpPr/>
+          <p:nvPr/>
+        </p:nvSpPr>
+        <p:spPr>
+          <a:xfrm>
+            <a:off x="1471612" y="3857625"/>
+            <a:ext cx="2243138" cy="857250"/>
+          </a:xfrm>
+          <a:prstGeom prst="rect">
+            <a:avLst/>
+          </a:prstGeom>
+        </p:spPr>
+        <p:style>
+          <a:lnRef idx="2">
+            <a:schemeClr val="accent1">
+              <a:shade val="50000"/>
+            </a:schemeClr>
+          </a:lnRef>
+          <a:fillRef idx="1">
+            <a:schemeClr val="accent1"/>
+          </a:fillRef>
+          <a:effectRef idx="0">
+            <a:schemeClr val="accent1"/>
+          </a:effectRef>
+          <a:fontRef idx="minor">
+            <a:schemeClr val="lt1"/>
+          </a:fontRef>
+        </p:style>
+        <p:txBody>
+          <a:bodyPr rtlCol="0" anchor="ctr"/>
+          <a:lstStyle/>
+          <a:p>
+            <a:pPr algn="ctr"/>
+            <a:r>
+              <a:rPr lang="de-DE" dirty="0" smtClean="0"/>
+              <a:t>50 Lizenzen/Monat</a:t>
+            </a:r>
+          </a:p>
+        </p:txBody>
+      </p:sp>
+      <p:sp>
+        <p:nvSpPr>
+          <p:cNvPr id="10" name="Rechteck 9"/>
+          <p:cNvSpPr/>
+          <p:nvPr/>
+        </p:nvSpPr>
+        <p:spPr>
+          <a:xfrm>
+            <a:off x="5004910" y="1885950"/>
+            <a:ext cx="2243138" cy="2828925"/>
+          </a:xfrm>
+          <a:prstGeom prst="rect">
+            <a:avLst/>
+          </a:prstGeom>
+        </p:spPr>
+        <p:style>
+          <a:lnRef idx="2">
+            <a:schemeClr val="accent1">
+              <a:shade val="50000"/>
+            </a:schemeClr>
+          </a:lnRef>
+          <a:fillRef idx="1">
+            <a:schemeClr val="accent1"/>
+          </a:fillRef>
+          <a:effectRef idx="0">
+            <a:schemeClr val="accent1"/>
+          </a:effectRef>
+          <a:fontRef idx="minor">
+            <a:schemeClr val="lt1"/>
+          </a:fontRef>
+        </p:style>
+        <p:txBody>
+          <a:bodyPr rtlCol="0" anchor="ctr"/>
+          <a:lstStyle/>
+          <a:p>
+            <a:pPr algn="ctr"/>
+            <a:r>
+              <a:rPr lang="de-DE" dirty="0" smtClean="0"/>
+              <a:t>100 Entfernungen/Monat</a:t>
+            </a:r>
+            <a:endParaRPr lang="es-CO" dirty="0"/>
+          </a:p>
+        </p:txBody>
+      </p:sp>
+      <p:sp>
+        <p:nvSpPr>
+          <p:cNvPr id="11" name="Rechteck 10"/>
+          <p:cNvSpPr/>
+          <p:nvPr/>
+        </p:nvSpPr>
+        <p:spPr>
+          <a:xfrm>
+            <a:off x="8538208" y="1885950"/>
+            <a:ext cx="2243138" cy="2828925"/>
+          </a:xfrm>
+          <a:prstGeom prst="rect">
+            <a:avLst/>
+          </a:prstGeom>
+        </p:spPr>
+        <p:style>
+          <a:lnRef idx="2">
+            <a:schemeClr val="accent1">
+              <a:shade val="50000"/>
+            </a:schemeClr>
+          </a:lnRef>
+          <a:fillRef idx="1">
+            <a:schemeClr val="accent1"/>
+          </a:fillRef>
+          <a:effectRef idx="0">
+            <a:schemeClr val="accent1"/>
+          </a:effectRef>
+          <a:fontRef idx="minor">
+            <a:schemeClr val="lt1"/>
+          </a:fontRef>
+        </p:style>
+        <p:txBody>
+          <a:bodyPr rtlCol="0" anchor="ctr"/>
+          <a:lstStyle/>
+          <a:p>
+            <a:pPr algn="ctr"/>
+            <a:r>
+              <a:rPr lang="de-DE" dirty="0" smtClean="0"/>
+              <a:t>4 Rechtsstreite </a:t>
+            </a:r>
+            <a:r>
+              <a:rPr lang="de-DE" smtClean="0"/>
+              <a:t>/ Monat</a:t>
+            </a:r>
+            <a:endParaRPr lang="es-CO" dirty="0"/>
           </a:p>
         </p:txBody>
       </p:sp>

</xml_diff>